<commit_message>
add ex 4.2 momentum chapter
</commit_message>
<xml_diff>
--- a/figures/MomentumAndCM/MoreFigures.pptx
+++ b/figures/MomentumAndCM/MoreFigures.pptx
@@ -9,6 +9,7 @@
     <p:sldId id="257" r:id="rId3"/>
     <p:sldId id="259" r:id="rId4"/>
     <p:sldId id="258" r:id="rId5"/>
+    <p:sldId id="260" r:id="rId6"/>
   </p:sldIdLst>
   <p:sldSz cx="12192000" cy="6858000"/>
   <p:notesSz cx="6858000" cy="9144000"/>
@@ -107,6 +108,11 @@
       </a:defRPr>
     </a:lvl9pPr>
   </p:defaultTextStyle>
+  <p:extLst>
+    <p:ext uri="{EFAFB233-063F-42B5-8137-9DF3F51BA10A}">
+      <p15:sldGuideLst xmlns:p15="http://schemas.microsoft.com/office/powerpoint/2012/main"/>
+    </p:ext>
+  </p:extLst>
 </p:presentation>
 </file>
 
@@ -257,7 +263,7 @@
           <a:p>
             <a:fld id="{AC3AFBC4-1A2C-45B5-A215-F42A95563514}" type="datetimeFigureOut">
               <a:rPr lang="en-US" smtClean="0"/>
-              <a:t>5/26/2024</a:t>
+              <a:t>12/19/2024</a:t>
             </a:fld>
             <a:endParaRPr lang="en-US"/>
           </a:p>
@@ -455,7 +461,7 @@
           <a:p>
             <a:fld id="{AC3AFBC4-1A2C-45B5-A215-F42A95563514}" type="datetimeFigureOut">
               <a:rPr lang="en-US" smtClean="0"/>
-              <a:t>5/26/2024</a:t>
+              <a:t>12/19/2024</a:t>
             </a:fld>
             <a:endParaRPr lang="en-US"/>
           </a:p>
@@ -663,7 +669,7 @@
           <a:p>
             <a:fld id="{AC3AFBC4-1A2C-45B5-A215-F42A95563514}" type="datetimeFigureOut">
               <a:rPr lang="en-US" smtClean="0"/>
-              <a:t>5/26/2024</a:t>
+              <a:t>12/19/2024</a:t>
             </a:fld>
             <a:endParaRPr lang="en-US"/>
           </a:p>
@@ -861,7 +867,7 @@
           <a:p>
             <a:fld id="{AC3AFBC4-1A2C-45B5-A215-F42A95563514}" type="datetimeFigureOut">
               <a:rPr lang="en-US" smtClean="0"/>
-              <a:t>5/26/2024</a:t>
+              <a:t>12/19/2024</a:t>
             </a:fld>
             <a:endParaRPr lang="en-US"/>
           </a:p>
@@ -1136,7 +1142,7 @@
           <a:p>
             <a:fld id="{AC3AFBC4-1A2C-45B5-A215-F42A95563514}" type="datetimeFigureOut">
               <a:rPr lang="en-US" smtClean="0"/>
-              <a:t>5/26/2024</a:t>
+              <a:t>12/19/2024</a:t>
             </a:fld>
             <a:endParaRPr lang="en-US"/>
           </a:p>
@@ -1401,7 +1407,7 @@
           <a:p>
             <a:fld id="{AC3AFBC4-1A2C-45B5-A215-F42A95563514}" type="datetimeFigureOut">
               <a:rPr lang="en-US" smtClean="0"/>
-              <a:t>5/26/2024</a:t>
+              <a:t>12/19/2024</a:t>
             </a:fld>
             <a:endParaRPr lang="en-US"/>
           </a:p>
@@ -1813,7 +1819,7 @@
           <a:p>
             <a:fld id="{AC3AFBC4-1A2C-45B5-A215-F42A95563514}" type="datetimeFigureOut">
               <a:rPr lang="en-US" smtClean="0"/>
-              <a:t>5/26/2024</a:t>
+              <a:t>12/19/2024</a:t>
             </a:fld>
             <a:endParaRPr lang="en-US"/>
           </a:p>
@@ -1954,7 +1960,7 @@
           <a:p>
             <a:fld id="{AC3AFBC4-1A2C-45B5-A215-F42A95563514}" type="datetimeFigureOut">
               <a:rPr lang="en-US" smtClean="0"/>
-              <a:t>5/26/2024</a:t>
+              <a:t>12/19/2024</a:t>
             </a:fld>
             <a:endParaRPr lang="en-US"/>
           </a:p>
@@ -2067,7 +2073,7 @@
           <a:p>
             <a:fld id="{AC3AFBC4-1A2C-45B5-A215-F42A95563514}" type="datetimeFigureOut">
               <a:rPr lang="en-US" smtClean="0"/>
-              <a:t>5/26/2024</a:t>
+              <a:t>12/19/2024</a:t>
             </a:fld>
             <a:endParaRPr lang="en-US"/>
           </a:p>
@@ -2378,7 +2384,7 @@
           <a:p>
             <a:fld id="{AC3AFBC4-1A2C-45B5-A215-F42A95563514}" type="datetimeFigureOut">
               <a:rPr lang="en-US" smtClean="0"/>
-              <a:t>5/26/2024</a:t>
+              <a:t>12/19/2024</a:t>
             </a:fld>
             <a:endParaRPr lang="en-US"/>
           </a:p>
@@ -2666,7 +2672,7 @@
           <a:p>
             <a:fld id="{AC3AFBC4-1A2C-45B5-A215-F42A95563514}" type="datetimeFigureOut">
               <a:rPr lang="en-US" smtClean="0"/>
-              <a:t>5/26/2024</a:t>
+              <a:t>12/19/2024</a:t>
             </a:fld>
             <a:endParaRPr lang="en-US"/>
           </a:p>
@@ -2907,7 +2913,7 @@
           <a:p>
             <a:fld id="{AC3AFBC4-1A2C-45B5-A215-F42A95563514}" type="datetimeFigureOut">
               <a:rPr lang="en-US" smtClean="0"/>
-              <a:t>5/26/2024</a:t>
+              <a:t>12/19/2024</a:t>
             </a:fld>
             <a:endParaRPr lang="en-US"/>
           </a:p>
@@ -3551,8 +3557,8 @@
           </a:fontRef>
         </p:style>
       </p:cxnSp>
-      <mc:AlternateContent xmlns:mc="http://schemas.openxmlformats.org/markup-compatibility/2006">
-        <mc:Choice xmlns:a14="http://schemas.microsoft.com/office/drawing/2010/main" Requires="a14">
+      <mc:AlternateContent xmlns:mc="http://schemas.openxmlformats.org/markup-compatibility/2006" xmlns:a14="http://schemas.microsoft.com/office/drawing/2010/main">
+        <mc:Choice Requires="a14">
           <p:sp>
             <p:nvSpPr>
               <p:cNvPr id="5" name="TextBox 4">
@@ -3581,7 +3587,6 @@
               </a:bodyPr>
               <a:lstStyle/>
               <a:p>
-                <a:pPr/>
                 <a14:m>
                   <m:oMath xmlns:m="http://schemas.openxmlformats.org/officeDocument/2006/math">
                     <m:r>
@@ -3600,7 +3605,7 @@
             </p:txBody>
           </p:sp>
         </mc:Choice>
-        <mc:Fallback>
+        <mc:Fallback xmlns="">
           <p:sp>
             <p:nvSpPr>
               <p:cNvPr id="5" name="TextBox 4">
@@ -3645,8 +3650,8 @@
           </p:sp>
         </mc:Fallback>
       </mc:AlternateContent>
-      <mc:AlternateContent xmlns:mc="http://schemas.openxmlformats.org/markup-compatibility/2006">
-        <mc:Choice xmlns:a14="http://schemas.microsoft.com/office/drawing/2010/main" Requires="a14">
+      <mc:AlternateContent xmlns:mc="http://schemas.openxmlformats.org/markup-compatibility/2006" xmlns:a14="http://schemas.microsoft.com/office/drawing/2010/main">
+        <mc:Choice Requires="a14">
           <p:sp>
             <p:nvSpPr>
               <p:cNvPr id="6" name="TextBox 5">
@@ -3675,7 +3680,6 @@
               </a:bodyPr>
               <a:lstStyle/>
               <a:p>
-                <a:pPr/>
                 <a14:m>
                   <m:oMath xmlns:m="http://schemas.openxmlformats.org/officeDocument/2006/math">
                     <m:r>
@@ -3694,7 +3698,7 @@
             </p:txBody>
           </p:sp>
         </mc:Choice>
-        <mc:Fallback>
+        <mc:Fallback xmlns="">
           <p:sp>
             <p:nvSpPr>
               <p:cNvPr id="6" name="TextBox 5">
@@ -4885,8 +4889,8 @@
           </a:p>
         </p:txBody>
       </p:sp>
-      <mc:AlternateContent xmlns:mc="http://schemas.openxmlformats.org/markup-compatibility/2006">
-        <mc:Choice xmlns:a14="http://schemas.microsoft.com/office/drawing/2010/main" Requires="a14">
+      <mc:AlternateContent xmlns:mc="http://schemas.openxmlformats.org/markup-compatibility/2006" xmlns:a14="http://schemas.microsoft.com/office/drawing/2010/main">
+        <mc:Choice Requires="a14">
           <p:sp>
             <p:nvSpPr>
               <p:cNvPr id="2" name="TextBox 1">
@@ -4958,7 +4962,7 @@
             </p:txBody>
           </p:sp>
         </mc:Choice>
-        <mc:Fallback>
+        <mc:Fallback xmlns="">
           <p:sp>
             <p:nvSpPr>
               <p:cNvPr id="2" name="TextBox 1">
@@ -6751,8 +6755,8 @@
           </a:p>
         </p:txBody>
       </p:sp>
-      <mc:AlternateContent xmlns:mc="http://schemas.openxmlformats.org/markup-compatibility/2006">
-        <mc:Choice xmlns:a14="http://schemas.microsoft.com/office/drawing/2010/main" Requires="a14">
+      <mc:AlternateContent xmlns:mc="http://schemas.openxmlformats.org/markup-compatibility/2006" xmlns:a14="http://schemas.microsoft.com/office/drawing/2010/main">
+        <mc:Choice Requires="a14">
           <p:sp>
             <p:nvSpPr>
               <p:cNvPr id="48" name="TextBox 47">
@@ -6805,7 +6809,7 @@
             </p:txBody>
           </p:sp>
         </mc:Choice>
-        <mc:Fallback>
+        <mc:Fallback xmlns="">
           <p:sp>
             <p:nvSpPr>
               <p:cNvPr id="48" name="TextBox 47">
@@ -6850,8 +6854,8 @@
           </p:sp>
         </mc:Fallback>
       </mc:AlternateContent>
-      <mc:AlternateContent xmlns:mc="http://schemas.openxmlformats.org/markup-compatibility/2006">
-        <mc:Choice xmlns:a14="http://schemas.microsoft.com/office/drawing/2010/main" Requires="a14">
+      <mc:AlternateContent xmlns:mc="http://schemas.openxmlformats.org/markup-compatibility/2006" xmlns:a14="http://schemas.microsoft.com/office/drawing/2010/main">
+        <mc:Choice Requires="a14">
           <p:sp>
             <p:nvSpPr>
               <p:cNvPr id="49" name="TextBox 48">
@@ -6898,7 +6902,7 @@
             </p:txBody>
           </p:sp>
         </mc:Choice>
-        <mc:Fallback>
+        <mc:Fallback xmlns="">
           <p:sp>
             <p:nvSpPr>
               <p:cNvPr id="49" name="TextBox 48">
@@ -6943,8 +6947,8 @@
           </p:sp>
         </mc:Fallback>
       </mc:AlternateContent>
-      <mc:AlternateContent xmlns:mc="http://schemas.openxmlformats.org/markup-compatibility/2006">
-        <mc:Choice xmlns:a14="http://schemas.microsoft.com/office/drawing/2010/main" Requires="a14">
+      <mc:AlternateContent xmlns:mc="http://schemas.openxmlformats.org/markup-compatibility/2006" xmlns:a14="http://schemas.microsoft.com/office/drawing/2010/main">
+        <mc:Choice Requires="a14">
           <p:sp>
             <p:nvSpPr>
               <p:cNvPr id="51" name="TextBox 50">
@@ -6991,7 +6995,7 @@
             </p:txBody>
           </p:sp>
         </mc:Choice>
-        <mc:Fallback>
+        <mc:Fallback xmlns="">
           <p:sp>
             <p:nvSpPr>
               <p:cNvPr id="51" name="TextBox 50">
@@ -7036,8 +7040,8 @@
           </p:sp>
         </mc:Fallback>
       </mc:AlternateContent>
-      <mc:AlternateContent xmlns:mc="http://schemas.openxmlformats.org/markup-compatibility/2006">
-        <mc:Choice xmlns:a14="http://schemas.microsoft.com/office/drawing/2010/main" Requires="a14">
+      <mc:AlternateContent xmlns:mc="http://schemas.openxmlformats.org/markup-compatibility/2006" xmlns:a14="http://schemas.microsoft.com/office/drawing/2010/main">
+        <mc:Choice Requires="a14">
           <p:sp>
             <p:nvSpPr>
               <p:cNvPr id="52" name="TextBox 51">
@@ -7084,7 +7088,7 @@
             </p:txBody>
           </p:sp>
         </mc:Choice>
-        <mc:Fallback>
+        <mc:Fallback xmlns="">
           <p:sp>
             <p:nvSpPr>
               <p:cNvPr id="52" name="TextBox 51">
@@ -7129,8 +7133,8 @@
           </p:sp>
         </mc:Fallback>
       </mc:AlternateContent>
-      <mc:AlternateContent xmlns:mc="http://schemas.openxmlformats.org/markup-compatibility/2006">
-        <mc:Choice xmlns:a14="http://schemas.microsoft.com/office/drawing/2010/main" Requires="a14">
+      <mc:AlternateContent xmlns:mc="http://schemas.openxmlformats.org/markup-compatibility/2006" xmlns:a14="http://schemas.microsoft.com/office/drawing/2010/main">
+        <mc:Choice Requires="a14">
           <p:sp>
             <p:nvSpPr>
               <p:cNvPr id="53" name="TextBox 52">
@@ -7177,7 +7181,7 @@
             </p:txBody>
           </p:sp>
         </mc:Choice>
-        <mc:Fallback>
+        <mc:Fallback xmlns="">
           <p:sp>
             <p:nvSpPr>
               <p:cNvPr id="53" name="TextBox 52">
@@ -7222,8 +7226,8 @@
           </p:sp>
         </mc:Fallback>
       </mc:AlternateContent>
-      <mc:AlternateContent xmlns:mc="http://schemas.openxmlformats.org/markup-compatibility/2006">
-        <mc:Choice xmlns:a14="http://schemas.microsoft.com/office/drawing/2010/main" Requires="a14">
+      <mc:AlternateContent xmlns:mc="http://schemas.openxmlformats.org/markup-compatibility/2006" xmlns:a14="http://schemas.microsoft.com/office/drawing/2010/main">
+        <mc:Choice Requires="a14">
           <p:sp>
             <p:nvSpPr>
               <p:cNvPr id="54" name="TextBox 53">
@@ -7270,7 +7274,7 @@
             </p:txBody>
           </p:sp>
         </mc:Choice>
-        <mc:Fallback>
+        <mc:Fallback xmlns="">
           <p:sp>
             <p:nvSpPr>
               <p:cNvPr id="54" name="TextBox 53">
@@ -7315,8 +7319,8 @@
           </p:sp>
         </mc:Fallback>
       </mc:AlternateContent>
-      <mc:AlternateContent xmlns:mc="http://schemas.openxmlformats.org/markup-compatibility/2006">
-        <mc:Choice xmlns:a14="http://schemas.microsoft.com/office/drawing/2010/main" Requires="a14">
+      <mc:AlternateContent xmlns:mc="http://schemas.openxmlformats.org/markup-compatibility/2006" xmlns:a14="http://schemas.microsoft.com/office/drawing/2010/main">
+        <mc:Choice Requires="a14">
           <p:sp>
             <p:nvSpPr>
               <p:cNvPr id="55" name="TextBox 54">
@@ -7363,7 +7367,7 @@
             </p:txBody>
           </p:sp>
         </mc:Choice>
-        <mc:Fallback>
+        <mc:Fallback xmlns="">
           <p:sp>
             <p:nvSpPr>
               <p:cNvPr id="55" name="TextBox 54">
@@ -7408,8 +7412,8 @@
           </p:sp>
         </mc:Fallback>
       </mc:AlternateContent>
-      <mc:AlternateContent xmlns:mc="http://schemas.openxmlformats.org/markup-compatibility/2006">
-        <mc:Choice xmlns:a14="http://schemas.microsoft.com/office/drawing/2010/main" Requires="a14">
+      <mc:AlternateContent xmlns:mc="http://schemas.openxmlformats.org/markup-compatibility/2006" xmlns:a14="http://schemas.microsoft.com/office/drawing/2010/main">
+        <mc:Choice Requires="a14">
           <p:sp>
             <p:nvSpPr>
               <p:cNvPr id="56" name="TextBox 55">
@@ -7456,7 +7460,7 @@
             </p:txBody>
           </p:sp>
         </mc:Choice>
-        <mc:Fallback>
+        <mc:Fallback xmlns="">
           <p:sp>
             <p:nvSpPr>
               <p:cNvPr id="56" name="TextBox 55">
@@ -7501,8 +7505,8 @@
           </p:sp>
         </mc:Fallback>
       </mc:AlternateContent>
-      <mc:AlternateContent xmlns:mc="http://schemas.openxmlformats.org/markup-compatibility/2006">
-        <mc:Choice xmlns:a14="http://schemas.microsoft.com/office/drawing/2010/main" Requires="a14">
+      <mc:AlternateContent xmlns:mc="http://schemas.openxmlformats.org/markup-compatibility/2006" xmlns:a14="http://schemas.microsoft.com/office/drawing/2010/main">
+        <mc:Choice Requires="a14">
           <p:sp>
             <p:nvSpPr>
               <p:cNvPr id="57" name="TextBox 56">
@@ -7549,7 +7553,7 @@
             </p:txBody>
           </p:sp>
         </mc:Choice>
-        <mc:Fallback>
+        <mc:Fallback xmlns="">
           <p:sp>
             <p:nvSpPr>
               <p:cNvPr id="57" name="TextBox 56">
@@ -7594,8 +7598,8 @@
           </p:sp>
         </mc:Fallback>
       </mc:AlternateContent>
-      <mc:AlternateContent xmlns:mc="http://schemas.openxmlformats.org/markup-compatibility/2006">
-        <mc:Choice xmlns:a14="http://schemas.microsoft.com/office/drawing/2010/main" Requires="a14">
+      <mc:AlternateContent xmlns:mc="http://schemas.openxmlformats.org/markup-compatibility/2006" xmlns:a14="http://schemas.microsoft.com/office/drawing/2010/main">
+        <mc:Choice Requires="a14">
           <p:sp>
             <p:nvSpPr>
               <p:cNvPr id="58" name="TextBox 57">
@@ -7642,7 +7646,7 @@
             </p:txBody>
           </p:sp>
         </mc:Choice>
-        <mc:Fallback>
+        <mc:Fallback xmlns="">
           <p:sp>
             <p:nvSpPr>
               <p:cNvPr id="58" name="TextBox 57">
@@ -7687,8 +7691,8 @@
           </p:sp>
         </mc:Fallback>
       </mc:AlternateContent>
-      <mc:AlternateContent xmlns:mc="http://schemas.openxmlformats.org/markup-compatibility/2006">
-        <mc:Choice xmlns:a14="http://schemas.microsoft.com/office/drawing/2010/main" Requires="a14">
+      <mc:AlternateContent xmlns:mc="http://schemas.openxmlformats.org/markup-compatibility/2006" xmlns:a14="http://schemas.microsoft.com/office/drawing/2010/main">
+        <mc:Choice Requires="a14">
           <p:sp>
             <p:nvSpPr>
               <p:cNvPr id="59" name="TextBox 58">
@@ -7717,7 +7721,6 @@
               </a:bodyPr>
               <a:lstStyle/>
               <a:p>
-                <a:pPr/>
                 <a14:m>
                   <m:oMath xmlns:m="http://schemas.openxmlformats.org/officeDocument/2006/math">
                     <m:r>
@@ -7736,7 +7739,7 @@
             </p:txBody>
           </p:sp>
         </mc:Choice>
-        <mc:Fallback>
+        <mc:Fallback xmlns="">
           <p:sp>
             <p:nvSpPr>
               <p:cNvPr id="59" name="TextBox 58">
@@ -7781,8 +7784,8 @@
           </p:sp>
         </mc:Fallback>
       </mc:AlternateContent>
-      <mc:AlternateContent xmlns:mc="http://schemas.openxmlformats.org/markup-compatibility/2006">
-        <mc:Choice xmlns:a14="http://schemas.microsoft.com/office/drawing/2010/main" Requires="a14">
+      <mc:AlternateContent xmlns:mc="http://schemas.openxmlformats.org/markup-compatibility/2006" xmlns:a14="http://schemas.microsoft.com/office/drawing/2010/main">
+        <mc:Choice Requires="a14">
           <p:sp>
             <p:nvSpPr>
               <p:cNvPr id="60" name="TextBox 59">
@@ -7811,7 +7814,6 @@
               </a:bodyPr>
               <a:lstStyle/>
               <a:p>
-                <a:pPr/>
                 <a14:m>
                   <m:oMath xmlns:m="http://schemas.openxmlformats.org/officeDocument/2006/math">
                     <m:r>
@@ -7830,7 +7832,7 @@
             </p:txBody>
           </p:sp>
         </mc:Choice>
-        <mc:Fallback>
+        <mc:Fallback xmlns="">
           <p:sp>
             <p:nvSpPr>
               <p:cNvPr id="60" name="TextBox 59">
@@ -7879,6 +7881,700 @@
     <p:extLst>
       <p:ext uri="{BB962C8B-B14F-4D97-AF65-F5344CB8AC3E}">
         <p14:creationId xmlns:p14="http://schemas.microsoft.com/office/powerpoint/2010/main" val="1576863862"/>
+      </p:ext>
+    </p:extLst>
+  </p:cSld>
+  <p:clrMapOvr>
+    <a:masterClrMapping/>
+  </p:clrMapOvr>
+</p:sld>
+</file>
+
+<file path=ppt/slides/slide5.xml><?xml version="1.0" encoding="utf-8"?>
+<p:sld xmlns:a="http://schemas.openxmlformats.org/drawingml/2006/main" xmlns:r="http://schemas.openxmlformats.org/officeDocument/2006/relationships" xmlns:p="http://schemas.openxmlformats.org/presentationml/2006/main">
+  <p:cSld>
+    <p:spTree>
+      <p:nvGrpSpPr>
+        <p:cNvPr id="1" name=""/>
+        <p:cNvGrpSpPr/>
+        <p:nvPr/>
+      </p:nvGrpSpPr>
+      <p:grpSpPr>
+        <a:xfrm>
+          <a:off x="0" y="0"/>
+          <a:ext cx="0" cy="0"/>
+          <a:chOff x="0" y="0"/>
+          <a:chExt cx="0" cy="0"/>
+        </a:xfrm>
+      </p:grpSpPr>
+      <p:cxnSp>
+        <p:nvCxnSpPr>
+          <p:cNvPr id="3" name="Straight Arrow Connector 2">
+            <a:extLst>
+              <a:ext uri="{FF2B5EF4-FFF2-40B4-BE49-F238E27FC236}">
+                <a16:creationId xmlns:a16="http://schemas.microsoft.com/office/drawing/2014/main" id="{051BEF05-3B48-74C2-45A5-BF1E768B1F41}"/>
+              </a:ext>
+            </a:extLst>
+          </p:cNvPr>
+          <p:cNvCxnSpPr/>
+          <p:nvPr/>
+        </p:nvCxnSpPr>
+        <p:spPr>
+          <a:xfrm>
+            <a:off x="1679375" y="6086475"/>
+            <a:ext cx="9144000" cy="0"/>
+          </a:xfrm>
+          <a:prstGeom prst="straightConnector1">
+            <a:avLst/>
+          </a:prstGeom>
+          <a:ln w="38100">
+            <a:solidFill>
+              <a:schemeClr val="tx1"/>
+            </a:solidFill>
+            <a:tailEnd type="triangle"/>
+          </a:ln>
+        </p:spPr>
+        <p:style>
+          <a:lnRef idx="2">
+            <a:schemeClr val="accent1"/>
+          </a:lnRef>
+          <a:fillRef idx="0">
+            <a:schemeClr val="accent1"/>
+          </a:fillRef>
+          <a:effectRef idx="1">
+            <a:schemeClr val="accent1"/>
+          </a:effectRef>
+          <a:fontRef idx="minor">
+            <a:schemeClr val="tx1"/>
+          </a:fontRef>
+        </p:style>
+      </p:cxnSp>
+      <p:cxnSp>
+        <p:nvCxnSpPr>
+          <p:cNvPr id="4" name="Straight Arrow Connector 3">
+            <a:extLst>
+              <a:ext uri="{FF2B5EF4-FFF2-40B4-BE49-F238E27FC236}">
+                <a16:creationId xmlns:a16="http://schemas.microsoft.com/office/drawing/2014/main" id="{EC9BDDAC-202D-9678-D59D-1AE61621BA25}"/>
+              </a:ext>
+            </a:extLst>
+          </p:cNvPr>
+          <p:cNvCxnSpPr>
+            <a:cxnSpLocks/>
+          </p:cNvCxnSpPr>
+          <p:nvPr/>
+        </p:nvCxnSpPr>
+        <p:spPr>
+          <a:xfrm flipV="1">
+            <a:off x="10823375" y="1514475"/>
+            <a:ext cx="0" cy="4572000"/>
+          </a:xfrm>
+          <a:prstGeom prst="straightConnector1">
+            <a:avLst/>
+          </a:prstGeom>
+          <a:ln w="38100">
+            <a:solidFill>
+              <a:schemeClr val="tx1"/>
+            </a:solidFill>
+            <a:tailEnd type="triangle"/>
+          </a:ln>
+        </p:spPr>
+        <p:style>
+          <a:lnRef idx="2">
+            <a:schemeClr val="accent1"/>
+          </a:lnRef>
+          <a:fillRef idx="0">
+            <a:schemeClr val="accent1"/>
+          </a:fillRef>
+          <a:effectRef idx="1">
+            <a:schemeClr val="accent1"/>
+          </a:effectRef>
+          <a:fontRef idx="minor">
+            <a:schemeClr val="tx1"/>
+          </a:fontRef>
+        </p:style>
+      </p:cxnSp>
+      <p:cxnSp>
+        <p:nvCxnSpPr>
+          <p:cNvPr id="6" name="Straight Arrow Connector 5">
+            <a:extLst>
+              <a:ext uri="{FF2B5EF4-FFF2-40B4-BE49-F238E27FC236}">
+                <a16:creationId xmlns:a16="http://schemas.microsoft.com/office/drawing/2014/main" id="{9130450C-9AA6-5C86-ECEA-60DF045E7677}"/>
+              </a:ext>
+            </a:extLst>
+          </p:cNvPr>
+          <p:cNvCxnSpPr>
+            <a:cxnSpLocks/>
+          </p:cNvCxnSpPr>
+          <p:nvPr/>
+        </p:nvCxnSpPr>
+        <p:spPr>
+          <a:xfrm flipV="1">
+            <a:off x="1679375" y="1514475"/>
+            <a:ext cx="9144000" cy="4571999"/>
+          </a:xfrm>
+          <a:prstGeom prst="straightConnector1">
+            <a:avLst/>
+          </a:prstGeom>
+          <a:ln w="38100">
+            <a:solidFill>
+              <a:srgbClr val="FF0000"/>
+            </a:solidFill>
+            <a:tailEnd type="triangle"/>
+          </a:ln>
+        </p:spPr>
+        <p:style>
+          <a:lnRef idx="2">
+            <a:schemeClr val="accent1"/>
+          </a:lnRef>
+          <a:fillRef idx="0">
+            <a:schemeClr val="accent1"/>
+          </a:fillRef>
+          <a:effectRef idx="1">
+            <a:schemeClr val="accent1"/>
+          </a:effectRef>
+          <a:fontRef idx="minor">
+            <a:schemeClr val="tx1"/>
+          </a:fontRef>
+        </p:style>
+      </p:cxnSp>
+      <p:sp>
+        <p:nvSpPr>
+          <p:cNvPr id="9" name="TextBox 8">
+            <a:extLst>
+              <a:ext uri="{FF2B5EF4-FFF2-40B4-BE49-F238E27FC236}">
+                <a16:creationId xmlns:a16="http://schemas.microsoft.com/office/drawing/2014/main" id="{A12BDE88-4F19-01F2-50F6-BB13051793DC}"/>
+              </a:ext>
+            </a:extLst>
+          </p:cNvPr>
+          <p:cNvSpPr txBox="1"/>
+          <p:nvPr/>
+        </p:nvSpPr>
+        <p:spPr>
+          <a:xfrm>
+            <a:off x="5640586" y="6181724"/>
+            <a:ext cx="910827" cy="369332"/>
+          </a:xfrm>
+          <a:prstGeom prst="rect">
+            <a:avLst/>
+          </a:prstGeom>
+          <a:noFill/>
+        </p:spPr>
+        <p:txBody>
+          <a:bodyPr wrap="none" rtlCol="0">
+            <a:spAutoFit/>
+          </a:bodyPr>
+          <a:lstStyle/>
+          <a:p>
+            <a:r>
+              <a:rPr lang="en-US" dirty="0"/>
+              <a:t>200 km</a:t>
+            </a:r>
+          </a:p>
+        </p:txBody>
+      </p:sp>
+      <p:cxnSp>
+        <p:nvCxnSpPr>
+          <p:cNvPr id="10" name="Straight Arrow Connector 9">
+            <a:extLst>
+              <a:ext uri="{FF2B5EF4-FFF2-40B4-BE49-F238E27FC236}">
+                <a16:creationId xmlns:a16="http://schemas.microsoft.com/office/drawing/2014/main" id="{267C3AED-55AD-DF69-1F58-BF2D9C3F8F1D}"/>
+              </a:ext>
+            </a:extLst>
+          </p:cNvPr>
+          <p:cNvCxnSpPr/>
+          <p:nvPr/>
+        </p:nvCxnSpPr>
+        <p:spPr>
+          <a:xfrm>
+            <a:off x="862559" y="2000431"/>
+            <a:ext cx="1371600" cy="0"/>
+          </a:xfrm>
+          <a:prstGeom prst="straightConnector1">
+            <a:avLst/>
+          </a:prstGeom>
+          <a:ln w="38100">
+            <a:solidFill>
+              <a:schemeClr val="tx1"/>
+            </a:solidFill>
+            <a:prstDash val="sysDot"/>
+            <a:tailEnd type="triangle"/>
+          </a:ln>
+        </p:spPr>
+        <p:style>
+          <a:lnRef idx="2">
+            <a:schemeClr val="accent1"/>
+          </a:lnRef>
+          <a:fillRef idx="0">
+            <a:schemeClr val="accent1"/>
+          </a:fillRef>
+          <a:effectRef idx="1">
+            <a:schemeClr val="accent1"/>
+          </a:effectRef>
+          <a:fontRef idx="minor">
+            <a:schemeClr val="tx1"/>
+          </a:fontRef>
+        </p:style>
+      </p:cxnSp>
+      <p:cxnSp>
+        <p:nvCxnSpPr>
+          <p:cNvPr id="11" name="Straight Arrow Connector 10">
+            <a:extLst>
+              <a:ext uri="{FF2B5EF4-FFF2-40B4-BE49-F238E27FC236}">
+                <a16:creationId xmlns:a16="http://schemas.microsoft.com/office/drawing/2014/main" id="{C09B9B74-22EB-3D56-CD40-57686B55532C}"/>
+              </a:ext>
+            </a:extLst>
+          </p:cNvPr>
+          <p:cNvCxnSpPr>
+            <a:cxnSpLocks/>
+          </p:cNvCxnSpPr>
+          <p:nvPr/>
+        </p:nvCxnSpPr>
+        <p:spPr>
+          <a:xfrm flipV="1">
+            <a:off x="875378" y="633104"/>
+            <a:ext cx="0" cy="1371600"/>
+          </a:xfrm>
+          <a:prstGeom prst="straightConnector1">
+            <a:avLst/>
+          </a:prstGeom>
+          <a:ln w="38100">
+            <a:solidFill>
+              <a:schemeClr val="tx1"/>
+            </a:solidFill>
+            <a:prstDash val="sysDot"/>
+            <a:tailEnd type="triangle"/>
+          </a:ln>
+        </p:spPr>
+        <p:style>
+          <a:lnRef idx="2">
+            <a:schemeClr val="accent1"/>
+          </a:lnRef>
+          <a:fillRef idx="0">
+            <a:schemeClr val="accent1"/>
+          </a:fillRef>
+          <a:effectRef idx="1">
+            <a:schemeClr val="accent1"/>
+          </a:effectRef>
+          <a:fontRef idx="minor">
+            <a:schemeClr val="tx1"/>
+          </a:fontRef>
+        </p:style>
+      </p:cxnSp>
+      <mc:AlternateContent xmlns:mc="http://schemas.openxmlformats.org/markup-compatibility/2006">
+        <mc:Choice xmlns:a14="http://schemas.microsoft.com/office/drawing/2010/main" Requires="a14">
+          <p:sp>
+            <p:nvSpPr>
+              <p:cNvPr id="12" name="TextBox 11">
+                <a:extLst>
+                  <a:ext uri="{FF2B5EF4-FFF2-40B4-BE49-F238E27FC236}">
+                    <a16:creationId xmlns:a16="http://schemas.microsoft.com/office/drawing/2014/main" id="{2C79DD7C-4746-5A76-64B5-6A248FBADEF6}"/>
+                  </a:ext>
+                </a:extLst>
+              </p:cNvPr>
+              <p:cNvSpPr txBox="1"/>
+              <p:nvPr/>
+            </p:nvSpPr>
+            <p:spPr>
+              <a:xfrm>
+                <a:off x="2210176" y="1815765"/>
+                <a:ext cx="361574" cy="369332"/>
+              </a:xfrm>
+              <a:prstGeom prst="rect">
+                <a:avLst/>
+              </a:prstGeom>
+              <a:noFill/>
+            </p:spPr>
+            <p:txBody>
+              <a:bodyPr wrap="none" rtlCol="0">
+                <a:spAutoFit/>
+              </a:bodyPr>
+              <a:lstStyle/>
+              <a:p>
+                <a14:m>
+                  <m:oMathPara xmlns:m="http://schemas.openxmlformats.org/officeDocument/2006/math">
+                    <m:oMathParaPr>
+                      <m:jc m:val="centerGroup"/>
+                    </m:oMathParaPr>
+                    <m:oMath xmlns:m="http://schemas.openxmlformats.org/officeDocument/2006/math">
+                      <m:acc>
+                        <m:accPr>
+                          <m:chr m:val="̂"/>
+                          <m:ctrlPr>
+                            <a:rPr lang="en-US" b="0" i="1" smtClean="0">
+                              <a:latin typeface="Cambria Math" panose="02040503050406030204" pitchFamily="18" charset="0"/>
+                            </a:rPr>
+                          </m:ctrlPr>
+                        </m:accPr>
+                        <m:e>
+                          <m:r>
+                            <a:rPr lang="en-US" b="0" i="1" smtClean="0">
+                              <a:latin typeface="Cambria Math" panose="02040503050406030204" pitchFamily="18" charset="0"/>
+                            </a:rPr>
+                            <m:t>𝑥</m:t>
+                          </m:r>
+                        </m:e>
+                      </m:acc>
+                    </m:oMath>
+                  </m:oMathPara>
+                </a14:m>
+                <a:endParaRPr lang="en-US" dirty="0"/>
+              </a:p>
+            </p:txBody>
+          </p:sp>
+        </mc:Choice>
+        <mc:Fallback>
+          <p:sp>
+            <p:nvSpPr>
+              <p:cNvPr id="12" name="TextBox 11">
+                <a:extLst>
+                  <a:ext uri="{FF2B5EF4-FFF2-40B4-BE49-F238E27FC236}">
+                    <a16:creationId xmlns:a16="http://schemas.microsoft.com/office/drawing/2014/main" id="{2C79DD7C-4746-5A76-64B5-6A248FBADEF6}"/>
+                  </a:ext>
+                </a:extLst>
+              </p:cNvPr>
+              <p:cNvSpPr txBox="1">
+                <a:spLocks noRot="1" noChangeAspect="1" noMove="1" noResize="1" noEditPoints="1" noAdjustHandles="1" noChangeArrowheads="1" noChangeShapeType="1" noTextEdit="1"/>
+              </p:cNvSpPr>
+              <p:nvPr/>
+            </p:nvSpPr>
+            <p:spPr>
+              <a:xfrm>
+                <a:off x="2210176" y="1815765"/>
+                <a:ext cx="361574" cy="369332"/>
+              </a:xfrm>
+              <a:prstGeom prst="rect">
+                <a:avLst/>
+              </a:prstGeom>
+              <a:blipFill>
+                <a:blip r:embed="rId2"/>
+                <a:stretch>
+                  <a:fillRect t="-6667" r="-13559"/>
+                </a:stretch>
+              </a:blipFill>
+            </p:spPr>
+            <p:txBody>
+              <a:bodyPr/>
+              <a:lstStyle/>
+              <a:p>
+                <a:r>
+                  <a:rPr lang="en-US">
+                    <a:noFill/>
+                  </a:rPr>
+                  <a:t> </a:t>
+                </a:r>
+              </a:p>
+            </p:txBody>
+          </p:sp>
+        </mc:Fallback>
+      </mc:AlternateContent>
+      <mc:AlternateContent xmlns:mc="http://schemas.openxmlformats.org/markup-compatibility/2006">
+        <mc:Choice xmlns:a14="http://schemas.microsoft.com/office/drawing/2010/main" Requires="a14">
+          <p:sp>
+            <p:nvSpPr>
+              <p:cNvPr id="13" name="TextBox 12">
+                <a:extLst>
+                  <a:ext uri="{FF2B5EF4-FFF2-40B4-BE49-F238E27FC236}">
+                    <a16:creationId xmlns:a16="http://schemas.microsoft.com/office/drawing/2014/main" id="{D909AC64-3AC7-0810-0D25-951AC869DCF6}"/>
+                  </a:ext>
+                </a:extLst>
+              </p:cNvPr>
+              <p:cNvSpPr txBox="1"/>
+              <p:nvPr/>
+            </p:nvSpPr>
+            <p:spPr>
+              <a:xfrm>
+                <a:off x="694591" y="263772"/>
+                <a:ext cx="361574" cy="369332"/>
+              </a:xfrm>
+              <a:prstGeom prst="rect">
+                <a:avLst/>
+              </a:prstGeom>
+              <a:noFill/>
+            </p:spPr>
+            <p:txBody>
+              <a:bodyPr wrap="none" rtlCol="0">
+                <a:spAutoFit/>
+              </a:bodyPr>
+              <a:lstStyle/>
+              <a:p>
+                <a14:m>
+                  <m:oMathPara xmlns:m="http://schemas.openxmlformats.org/officeDocument/2006/math">
+                    <m:oMathParaPr>
+                      <m:jc m:val="centerGroup"/>
+                    </m:oMathParaPr>
+                    <m:oMath xmlns:m="http://schemas.openxmlformats.org/officeDocument/2006/math">
+                      <m:acc>
+                        <m:accPr>
+                          <m:chr m:val="̂"/>
+                          <m:ctrlPr>
+                            <a:rPr lang="en-US" b="0" i="1" smtClean="0">
+                              <a:latin typeface="Cambria Math" panose="02040503050406030204" pitchFamily="18" charset="0"/>
+                            </a:rPr>
+                          </m:ctrlPr>
+                        </m:accPr>
+                        <m:e>
+                          <m:r>
+                            <a:rPr lang="en-US" b="0" i="1" smtClean="0">
+                              <a:latin typeface="Cambria Math" panose="02040503050406030204" pitchFamily="18" charset="0"/>
+                            </a:rPr>
+                            <m:t>𝑦</m:t>
+                          </m:r>
+                        </m:e>
+                      </m:acc>
+                    </m:oMath>
+                  </m:oMathPara>
+                </a14:m>
+                <a:endParaRPr lang="en-US" dirty="0"/>
+              </a:p>
+            </p:txBody>
+          </p:sp>
+        </mc:Choice>
+        <mc:Fallback>
+          <p:sp>
+            <p:nvSpPr>
+              <p:cNvPr id="13" name="TextBox 12">
+                <a:extLst>
+                  <a:ext uri="{FF2B5EF4-FFF2-40B4-BE49-F238E27FC236}">
+                    <a16:creationId xmlns:a16="http://schemas.microsoft.com/office/drawing/2014/main" id="{D909AC64-3AC7-0810-0D25-951AC869DCF6}"/>
+                  </a:ext>
+                </a:extLst>
+              </p:cNvPr>
+              <p:cNvSpPr txBox="1">
+                <a:spLocks noRot="1" noChangeAspect="1" noMove="1" noResize="1" noEditPoints="1" noAdjustHandles="1" noChangeArrowheads="1" noChangeShapeType="1" noTextEdit="1"/>
+              </p:cNvSpPr>
+              <p:nvPr/>
+            </p:nvSpPr>
+            <p:spPr>
+              <a:xfrm>
+                <a:off x="694591" y="263772"/>
+                <a:ext cx="361574" cy="369332"/>
+              </a:xfrm>
+              <a:prstGeom prst="rect">
+                <a:avLst/>
+              </a:prstGeom>
+              <a:blipFill>
+                <a:blip r:embed="rId3"/>
+                <a:stretch>
+                  <a:fillRect t="-6557" r="-15254" b="-6557"/>
+                </a:stretch>
+              </a:blipFill>
+            </p:spPr>
+            <p:txBody>
+              <a:bodyPr/>
+              <a:lstStyle/>
+              <a:p>
+                <a:r>
+                  <a:rPr lang="en-US">
+                    <a:noFill/>
+                  </a:rPr>
+                  <a:t> </a:t>
+                </a:r>
+              </a:p>
+            </p:txBody>
+          </p:sp>
+        </mc:Fallback>
+      </mc:AlternateContent>
+      <p:sp>
+        <p:nvSpPr>
+          <p:cNvPr id="18" name="TextBox 17">
+            <a:extLst>
+              <a:ext uri="{FF2B5EF4-FFF2-40B4-BE49-F238E27FC236}">
+                <a16:creationId xmlns:a16="http://schemas.microsoft.com/office/drawing/2014/main" id="{888F908C-8BE2-6E1E-11A4-FC4E59A81BF9}"/>
+              </a:ext>
+            </a:extLst>
+          </p:cNvPr>
+          <p:cNvSpPr txBox="1"/>
+          <p:nvPr/>
+        </p:nvSpPr>
+        <p:spPr>
+          <a:xfrm>
+            <a:off x="10951045" y="3615808"/>
+            <a:ext cx="910827" cy="369332"/>
+          </a:xfrm>
+          <a:prstGeom prst="rect">
+            <a:avLst/>
+          </a:prstGeom>
+          <a:noFill/>
+        </p:spPr>
+        <p:txBody>
+          <a:bodyPr wrap="none" rtlCol="0">
+            <a:spAutoFit/>
+          </a:bodyPr>
+          <a:lstStyle/>
+          <a:p>
+            <a:r>
+              <a:rPr lang="en-US" dirty="0"/>
+              <a:t>100 km</a:t>
+            </a:r>
+          </a:p>
+        </p:txBody>
+      </p:sp>
+      <p:pic>
+        <p:nvPicPr>
+          <p:cNvPr id="1028" name="Picture 4" descr="Free Free Train Clipart, Download Free Free Train Clipart png images, Free  ClipArts on Clipart Library">
+            <a:extLst>
+              <a:ext uri="{FF2B5EF4-FFF2-40B4-BE49-F238E27FC236}">
+                <a16:creationId xmlns:a16="http://schemas.microsoft.com/office/drawing/2014/main" id="{28C5206B-44AD-48BD-F275-7140AFB1835C}"/>
+              </a:ext>
+            </a:extLst>
+          </p:cNvPr>
+          <p:cNvPicPr>
+            <a:picLocks noChangeAspect="1" noChangeArrowheads="1"/>
+          </p:cNvPicPr>
+          <p:nvPr/>
+        </p:nvPicPr>
+        <p:blipFill>
+          <a:blip r:embed="rId4">
+            <a:extLst>
+              <a:ext uri="{28A0092B-C50C-407E-A947-70E740481C1C}">
+                <a14:useLocalDpi xmlns:a14="http://schemas.microsoft.com/office/drawing/2010/main" val="0"/>
+              </a:ext>
+            </a:extLst>
+          </a:blip>
+          <a:srcRect/>
+          <a:stretch>
+            <a:fillRect/>
+          </a:stretch>
+        </p:blipFill>
+        <p:spPr bwMode="auto">
+          <a:xfrm rot="19966702" flipH="1">
+            <a:off x="969356" y="3850399"/>
+            <a:ext cx="3503537" cy="1714361"/>
+          </a:xfrm>
+          <a:prstGeom prst="rect">
+            <a:avLst/>
+          </a:prstGeom>
+          <a:noFill/>
+          <a:extLst>
+            <a:ext uri="{909E8E84-426E-40DD-AFC4-6F175D3DCCD1}">
+              <a14:hiddenFill xmlns:a14="http://schemas.microsoft.com/office/drawing/2010/main">
+                <a:solidFill>
+                  <a:srgbClr val="FFFFFF"/>
+                </a:solidFill>
+              </a14:hiddenFill>
+            </a:ext>
+          </a:extLst>
+        </p:spPr>
+      </p:pic>
+      <p:pic>
+        <p:nvPicPr>
+          <p:cNvPr id="19" name="Picture 4" descr="Free Free Train Clipart, Download Free Free Train Clipart png images, Free  ClipArts on Clipart Library">
+            <a:extLst>
+              <a:ext uri="{FF2B5EF4-FFF2-40B4-BE49-F238E27FC236}">
+                <a16:creationId xmlns:a16="http://schemas.microsoft.com/office/drawing/2014/main" id="{0F446FAC-4E39-2CBB-3209-7B664E71B491}"/>
+              </a:ext>
+            </a:extLst>
+          </p:cNvPr>
+          <p:cNvPicPr>
+            <a:picLocks noChangeAspect="1" noChangeArrowheads="1"/>
+          </p:cNvPicPr>
+          <p:nvPr/>
+        </p:nvPicPr>
+        <p:blipFill rotWithShape="1">
+          <a:blip r:embed="rId4">
+            <a:extLst>
+              <a:ext uri="{28A0092B-C50C-407E-A947-70E740481C1C}">
+                <a14:useLocalDpi xmlns:a14="http://schemas.microsoft.com/office/drawing/2010/main" val="0"/>
+              </a:ext>
+            </a:extLst>
+          </a:blip>
+          <a:srcRect r="31713"/>
+          <a:stretch/>
+        </p:blipFill>
+        <p:spPr bwMode="auto">
+          <a:xfrm flipH="1">
+            <a:off x="3762875" y="4556779"/>
+            <a:ext cx="2392465" cy="1714361"/>
+          </a:xfrm>
+          <a:prstGeom prst="rect">
+            <a:avLst/>
+          </a:prstGeom>
+          <a:noFill/>
+          <a:extLst>
+            <a:ext uri="{909E8E84-426E-40DD-AFC4-6F175D3DCCD1}">
+              <a14:hiddenFill xmlns:a14="http://schemas.microsoft.com/office/drawing/2010/main">
+                <a:solidFill>
+                  <a:srgbClr val="FFFFFF"/>
+                </a:solidFill>
+              </a14:hiddenFill>
+            </a:ext>
+          </a:extLst>
+        </p:spPr>
+      </p:pic>
+      <p:sp>
+        <p:nvSpPr>
+          <p:cNvPr id="20" name="TextBox 19">
+            <a:extLst>
+              <a:ext uri="{FF2B5EF4-FFF2-40B4-BE49-F238E27FC236}">
+                <a16:creationId xmlns:a16="http://schemas.microsoft.com/office/drawing/2014/main" id="{33C0302A-3D90-2BB3-3145-D6459CFFCBC5}"/>
+              </a:ext>
+            </a:extLst>
+          </p:cNvPr>
+          <p:cNvSpPr txBox="1"/>
+          <p:nvPr/>
+        </p:nvSpPr>
+        <p:spPr>
+          <a:xfrm>
+            <a:off x="6095999" y="5229293"/>
+            <a:ext cx="2009524" cy="369332"/>
+          </a:xfrm>
+          <a:prstGeom prst="rect">
+            <a:avLst/>
+          </a:prstGeom>
+          <a:noFill/>
+        </p:spPr>
+        <p:txBody>
+          <a:bodyPr wrap="none" rtlCol="0">
+            <a:spAutoFit/>
+          </a:bodyPr>
+          <a:lstStyle/>
+          <a:p>
+            <a:r>
+              <a:rPr lang="en-US" dirty="0"/>
+              <a:t>Train A: 500 000 kg</a:t>
+            </a:r>
+          </a:p>
+        </p:txBody>
+      </p:sp>
+      <p:sp>
+        <p:nvSpPr>
+          <p:cNvPr id="21" name="TextBox 20">
+            <a:extLst>
+              <a:ext uri="{FF2B5EF4-FFF2-40B4-BE49-F238E27FC236}">
+                <a16:creationId xmlns:a16="http://schemas.microsoft.com/office/drawing/2014/main" id="{7514A30F-A1A2-AC16-E85A-920D493B5819}"/>
+              </a:ext>
+            </a:extLst>
+          </p:cNvPr>
+          <p:cNvSpPr txBox="1"/>
+          <p:nvPr/>
+        </p:nvSpPr>
+        <p:spPr>
+          <a:xfrm rot="19966687">
+            <a:off x="1260709" y="3815573"/>
+            <a:ext cx="2012730" cy="369332"/>
+          </a:xfrm>
+          <a:prstGeom prst="rect">
+            <a:avLst/>
+          </a:prstGeom>
+          <a:noFill/>
+        </p:spPr>
+        <p:txBody>
+          <a:bodyPr wrap="none" rtlCol="0">
+            <a:spAutoFit/>
+          </a:bodyPr>
+          <a:lstStyle/>
+          <a:p>
+            <a:r>
+              <a:rPr lang="en-US" dirty="0"/>
+              <a:t>Train B: 750 000 kg</a:t>
+            </a:r>
+          </a:p>
+        </p:txBody>
+      </p:sp>
+    </p:spTree>
+    <p:extLst>
+      <p:ext uri="{BB962C8B-B14F-4D97-AF65-F5344CB8AC3E}">
+        <p14:creationId xmlns:p14="http://schemas.microsoft.com/office/powerpoint/2010/main" val="2644020057"/>
       </p:ext>
     </p:extLst>
   </p:cSld>

</xml_diff>